<commit_message>
added microsoft vsan like solution infomation
</commit_message>
<xml_diff>
--- a/slides/2016/vsan_toi_part1.pptx
+++ b/slides/2016/vsan_toi_part1.pptx
@@ -6647,7 +6647,7 @@
           <a:p>
             <a:fld id="{299A7FBF-C2BD-4E6E-9411-3691FF3DB939}" type="datetimeFigureOut">
               <a:rPr lang="en-US" smtClean="0"/>
-              <a:t>1/7/2016</a:t>
+              <a:t>1/10/2016</a:t>
             </a:fld>
             <a:endParaRPr lang="en-US"/>
           </a:p>
@@ -7781,6 +7781,144 @@
 </p:notes>
 </file>
 
+<file path=ppt/notesSlides/notesSlide7.xml><?xml version="1.0" encoding="utf-8"?>
+<p:notes xmlns:a="http://schemas.openxmlformats.org/drawingml/2006/main" xmlns:r="http://schemas.openxmlformats.org/officeDocument/2006/relationships" xmlns:p="http://schemas.openxmlformats.org/presentationml/2006/main">
+  <p:cSld>
+    <p:spTree>
+      <p:nvGrpSpPr>
+        <p:cNvPr id="1" name=""/>
+        <p:cNvGrpSpPr/>
+        <p:nvPr/>
+      </p:nvGrpSpPr>
+      <p:grpSpPr>
+        <a:xfrm>
+          <a:off x="0" y="0"/>
+          <a:ext cx="0" cy="0"/>
+          <a:chOff x="0" y="0"/>
+          <a:chExt cx="0" cy="0"/>
+        </a:xfrm>
+      </p:grpSpPr>
+      <p:sp>
+        <p:nvSpPr>
+          <p:cNvPr id="2" name="Slide Image Placeholder 1"/>
+          <p:cNvSpPr>
+            <a:spLocks noGrp="1" noRot="1" noChangeAspect="1"/>
+          </p:cNvSpPr>
+          <p:nvPr>
+            <p:ph type="sldImg"/>
+          </p:nvPr>
+        </p:nvSpPr>
+        <p:spPr/>
+      </p:sp>
+      <p:sp>
+        <p:nvSpPr>
+          <p:cNvPr id="3" name="Notes Placeholder 2"/>
+          <p:cNvSpPr>
+            <a:spLocks noGrp="1"/>
+          </p:cNvSpPr>
+          <p:nvPr>
+            <p:ph type="body" idx="1"/>
+          </p:nvPr>
+        </p:nvSpPr>
+        <p:spPr/>
+        <p:txBody>
+          <a:bodyPr/>
+          <a:lstStyle/>
+          <a:p>
+            <a:r>
+              <a:rPr lang="en-US" dirty="0" smtClean="0"/>
+              <a:t>Microsoft</a:t>
+            </a:r>
+          </a:p>
+          <a:p>
+            <a:endParaRPr lang="en-US" dirty="0" smtClean="0"/>
+          </a:p>
+          <a:p>
+            <a:r>
+              <a:rPr lang="en-US" dirty="0" smtClean="0"/>
+              <a:t>http://www.hyper-v.nu/archives/dvanderpeijl/2015/06/hyperconverged-with-windows-server-2016/</a:t>
+            </a:r>
+          </a:p>
+          <a:p>
+            <a:endParaRPr lang="en-US" dirty="0" smtClean="0"/>
+          </a:p>
+          <a:p>
+            <a:pPr fontAlgn="base"/>
+            <a:r>
+              <a:rPr lang="en-US" sz="1200" b="1" i="0" kern="1200" dirty="0" smtClean="0">
+                <a:solidFill>
+                  <a:schemeClr val="tx1"/>
+                </a:solidFill>
+                <a:effectLst/>
+                <a:latin typeface="+mn-lt"/>
+                <a:ea typeface="+mn-ea"/>
+                <a:cs typeface="+mn-cs"/>
+              </a:rPr>
+              <a:t>Storage Spaces Direct</a:t>
+            </a:r>
+            <a:endParaRPr lang="en-US" sz="1200" b="0" i="0" kern="1200" dirty="0" smtClean="0">
+              <a:solidFill>
+                <a:schemeClr val="tx1"/>
+              </a:solidFill>
+              <a:effectLst/>
+              <a:latin typeface="+mn-lt"/>
+              <a:ea typeface="+mn-ea"/>
+              <a:cs typeface="+mn-cs"/>
+            </a:endParaRPr>
+          </a:p>
+          <a:p>
+            <a:pPr fontAlgn="base"/>
+            <a:r>
+              <a:rPr lang="en-US" sz="1200" b="0" i="0" kern="1200" smtClean="0">
+                <a:solidFill>
+                  <a:schemeClr val="tx1"/>
+                </a:solidFill>
+                <a:effectLst/>
+                <a:latin typeface="+mn-lt"/>
+                <a:ea typeface="+mn-ea"/>
+                <a:cs typeface="+mn-cs"/>
+              </a:rPr>
+              <a:t>With Storage Spaces Direct we have the ability to pool local disks of multiple servers to one big virtual disk.</a:t>
+            </a:r>
+          </a:p>
+        </p:txBody>
+      </p:sp>
+      <p:sp>
+        <p:nvSpPr>
+          <p:cNvPr id="4" name="Slide Number Placeholder 3"/>
+          <p:cNvSpPr>
+            <a:spLocks noGrp="1"/>
+          </p:cNvSpPr>
+          <p:nvPr>
+            <p:ph type="sldNum" sz="quarter" idx="10"/>
+          </p:nvPr>
+        </p:nvSpPr>
+        <p:spPr/>
+        <p:txBody>
+          <a:bodyPr/>
+          <a:lstStyle/>
+          <a:p>
+            <a:fld id="{6BFB3E7A-7FE4-42EC-A9D8-2719F1F05314}" type="slidenum">
+              <a:rPr lang="en-US" smtClean="0"/>
+              <a:t>20</a:t>
+            </a:fld>
+            <a:endParaRPr lang="en-US"/>
+          </a:p>
+        </p:txBody>
+      </p:sp>
+    </p:spTree>
+    <p:extLst>
+      <p:ext uri="{BB962C8B-B14F-4D97-AF65-F5344CB8AC3E}">
+        <p14:creationId xmlns:p14="http://schemas.microsoft.com/office/powerpoint/2010/main" val="2847125332"/>
+      </p:ext>
+    </p:extLst>
+  </p:cSld>
+  <p:clrMapOvr>
+    <a:masterClrMapping/>
+  </p:clrMapOvr>
+</p:notes>
+</file>
+
 <file path=ppt/slideLayouts/slideLayout1.xml><?xml version="1.0" encoding="utf-8"?>
 <p:sldLayout xmlns:a="http://schemas.openxmlformats.org/drawingml/2006/main" xmlns:r="http://schemas.openxmlformats.org/officeDocument/2006/relationships" xmlns:p="http://schemas.openxmlformats.org/presentationml/2006/main" showMasterSp="0" type="title" preserve="1">
   <p:cSld name="Title Slide">
@@ -8073,7 +8211,7 @@
             <a:fld id="{1D8BD707-D9CF-40AE-B4C6-C98DA3205C09}" type="datetimeFigureOut">
               <a:rPr lang="en-US" smtClean="0"/>
               <a:pPr/>
-              <a:t>1/7/2016</a:t>
+              <a:t>1/10/2016</a:t>
             </a:fld>
             <a:endParaRPr lang="en-US"/>
           </a:p>
@@ -8266,7 +8404,7 @@
             <a:fld id="{1D8BD707-D9CF-40AE-B4C6-C98DA3205C09}" type="datetimeFigureOut">
               <a:rPr lang="en-US" smtClean="0"/>
               <a:pPr/>
-              <a:t>1/7/2016</a:t>
+              <a:t>1/10/2016</a:t>
             </a:fld>
             <a:endParaRPr lang="en-US"/>
           </a:p>
@@ -8453,7 +8591,7 @@
             <a:fld id="{1D8BD707-D9CF-40AE-B4C6-C98DA3205C09}" type="datetimeFigureOut">
               <a:rPr lang="en-US" smtClean="0"/>
               <a:pPr/>
-              <a:t>1/7/2016</a:t>
+              <a:t>1/10/2016</a:t>
             </a:fld>
             <a:endParaRPr lang="en-US"/>
           </a:p>
@@ -8718,7 +8856,7 @@
             <a:fld id="{1D8BD707-D9CF-40AE-B4C6-C98DA3205C09}" type="datetimeFigureOut">
               <a:rPr lang="en-US" smtClean="0"/>
               <a:pPr/>
-              <a:t>1/7/2016</a:t>
+              <a:t>1/10/2016</a:t>
             </a:fld>
             <a:endParaRPr lang="en-US"/>
           </a:p>
@@ -9136,7 +9274,7 @@
             <a:fld id="{1D8BD707-D9CF-40AE-B4C6-C98DA3205C09}" type="datetimeFigureOut">
               <a:rPr lang="en-US" smtClean="0"/>
               <a:pPr/>
-              <a:t>1/7/2016</a:t>
+              <a:t>1/10/2016</a:t>
             </a:fld>
             <a:endParaRPr lang="en-US"/>
           </a:p>
@@ -9380,7 +9518,7 @@
             <a:fld id="{1D8BD707-D9CF-40AE-B4C6-C98DA3205C09}" type="datetimeFigureOut">
               <a:rPr lang="en-US" smtClean="0"/>
               <a:pPr/>
-              <a:t>1/7/2016</a:t>
+              <a:t>1/10/2016</a:t>
             </a:fld>
             <a:endParaRPr lang="en-US"/>
           </a:p>
@@ -9618,7 +9756,7 @@
             <a:fld id="{1D8BD707-D9CF-40AE-B4C6-C98DA3205C09}" type="datetimeFigureOut">
               <a:rPr lang="en-US" smtClean="0"/>
               <a:pPr/>
-              <a:t>1/7/2016</a:t>
+              <a:t>1/10/2016</a:t>
             </a:fld>
             <a:endParaRPr lang="en-US"/>
           </a:p>
@@ -9815,7 +9953,7 @@
             <a:fld id="{1D8BD707-D9CF-40AE-B4C6-C98DA3205C09}" type="datetimeFigureOut">
               <a:rPr lang="en-US" smtClean="0"/>
               <a:pPr/>
-              <a:t>1/7/2016</a:t>
+              <a:t>1/10/2016</a:t>
             </a:fld>
             <a:endParaRPr lang="en-US"/>
           </a:p>
@@ -9915,7 +10053,7 @@
             <a:fld id="{1D8BD707-D9CF-40AE-B4C6-C98DA3205C09}" type="datetimeFigureOut">
               <a:rPr lang="en-US" smtClean="0"/>
               <a:pPr/>
-              <a:t>1/7/2016</a:t>
+              <a:t>1/10/2016</a:t>
             </a:fld>
             <a:endParaRPr lang="en-US"/>
           </a:p>
@@ -10053,7 +10191,7 @@
             <a:fld id="{1D8BD707-D9CF-40AE-B4C6-C98DA3205C09}" type="datetimeFigureOut">
               <a:rPr lang="en-US" smtClean="0"/>
               <a:pPr/>
-              <a:t>1/7/2016</a:t>
+              <a:t>1/10/2016</a:t>
             </a:fld>
             <a:endParaRPr lang="en-US"/>
           </a:p>
@@ -10573,7 +10711,7 @@
             <a:fld id="{1D8BD707-D9CF-40AE-B4C6-C98DA3205C09}" type="datetimeFigureOut">
               <a:rPr lang="en-US" smtClean="0"/>
               <a:pPr/>
-              <a:t>1/7/2016</a:t>
+              <a:t>1/10/2016</a:t>
             </a:fld>
             <a:endParaRPr lang="en-US"/>
           </a:p>
@@ -10836,7 +10974,7 @@
             <a:fld id="{1D8BD707-D9CF-40AE-B4C6-C98DA3205C09}" type="datetimeFigureOut">
               <a:rPr lang="en-US" smtClean="0"/>
               <a:pPr/>
-              <a:t>1/7/2016</a:t>
+              <a:t>1/10/2016</a:t>
             </a:fld>
             <a:endParaRPr lang="en-US"/>
           </a:p>
@@ -11466,15 +11604,7 @@
             <a:pPr algn="r"/>
             <a:r>
               <a:rPr lang="en-US" dirty="0" smtClean="0"/>
-              <a:t>Compiled by </a:t>
-            </a:r>
-            <a:r>
-              <a:rPr lang="en-US" dirty="0" smtClean="0"/>
-              <a:t>Oliver </a:t>
-            </a:r>
-            <a:r>
-              <a:rPr lang="en-US" dirty="0" smtClean="0"/>
-              <a:t>Yang</a:t>
+              <a:t>Compiled by Oliver Yang</a:t>
             </a:r>
           </a:p>
           <a:p>
@@ -17810,11 +17940,6 @@
                 </a:rPr>
                 <a:t>Radically Simple</a:t>
               </a:r>
-              <a:endParaRPr lang="en-US" sz="2000" dirty="0">
-                <a:solidFill>
-                  <a:prstClr val="white"/>
-                </a:solidFill>
-              </a:endParaRPr>
             </a:p>
           </p:txBody>
         </p:sp>
@@ -18250,11 +18375,7 @@
               </a:pPr>
               <a:r>
                 <a:rPr lang="en-US" sz="1600" b="0" dirty="0" smtClean="0"/>
-                <a:t>No </a:t>
-              </a:r>
-              <a:r>
-                <a:rPr lang="en-US" sz="1600" b="0" dirty="0" smtClean="0"/>
-                <a:t>large upfront investments</a:t>
+                <a:t>No large upfront investments</a:t>
               </a:r>
             </a:p>
             <a:p>
@@ -18289,11 +18410,7 @@
               </a:pPr>
               <a:r>
                 <a:rPr lang="en-US" sz="1600" b="0" dirty="0" smtClean="0"/>
-                <a:t>Easy to operate with powerful </a:t>
-              </a:r>
-              <a:r>
-                <a:rPr lang="en-US" sz="1600" b="0" dirty="0" smtClean="0"/>
-                <a:t>automation</a:t>
+                <a:t>Easy to operate with powerful automation</a:t>
               </a:r>
             </a:p>
             <a:p>
@@ -18312,7 +18429,6 @@
                 <a:rPr lang="en-US" sz="1600" b="0" dirty="0" smtClean="0"/>
                 <a:t>No specialized skillset</a:t>
               </a:r>
-              <a:endParaRPr lang="en-US" sz="1600" b="0" dirty="0" smtClean="0"/>
             </a:p>
           </p:txBody>
         </p:sp>
@@ -22619,7 +22735,7 @@
           <p:nvPr/>
         </p:nvPicPr>
         <p:blipFill>
-          <a:blip r:embed="rId2">
+          <a:blip r:embed="rId3">
             <a:extLst>
               <a:ext uri="{28A0092B-C50C-407E-A947-70E740481C1C}">
                 <a14:useLocalDpi xmlns:a14="http://schemas.microsoft.com/office/drawing/2010/main" val="0"/>
@@ -23545,7 +23661,6 @@
               <a:rPr lang="en-US" sz="2800" dirty="0" smtClean="0"/>
               <a:t>Can’t meet virtualization/cloud requirements</a:t>
             </a:r>
-            <a:endParaRPr lang="en-US" sz="2800" dirty="0" smtClean="0"/>
           </a:p>
           <a:p>
             <a:pPr lvl="1"/>
@@ -23553,7 +23668,6 @@
               <a:rPr lang="en-US" sz="2400" dirty="0" smtClean="0"/>
               <a:t>Cloud/virtualization gives agility, flexibility and automation</a:t>
             </a:r>
-            <a:endParaRPr lang="en-US" sz="2400" dirty="0" smtClean="0"/>
           </a:p>
           <a:p>
             <a:pPr lvl="2"/>
@@ -23607,11 +23721,7 @@
             <a:pPr lvl="2"/>
             <a:r>
               <a:rPr lang="en-US" sz="1800" dirty="0" smtClean="0"/>
-              <a:t>Rigid </a:t>
-            </a:r>
-            <a:r>
-              <a:rPr lang="en-US" sz="1800" dirty="0" smtClean="0"/>
-              <a:t>provisioning</a:t>
+              <a:t>Rigid provisioning</a:t>
             </a:r>
           </a:p>
           <a:p>
@@ -23744,11 +23854,7 @@
             </a:r>
             <a:r>
               <a:rPr lang="en-US" sz="2400" dirty="0" smtClean="0"/>
-              <a:t>OPEX </a:t>
-            </a:r>
-            <a:r>
-              <a:rPr lang="en-US" sz="2400" dirty="0" smtClean="0"/>
-              <a:t>caused by multiple storage silos</a:t>
+              <a:t>OPEX caused by multiple storage silos</a:t>
             </a:r>
             <a:endParaRPr lang="en-US" sz="2400" dirty="0"/>
           </a:p>

</xml_diff>